<commit_message>
must have modified this and not commited it
</commit_message>
<xml_diff>
--- a/research/Tickets_and_Data_Structure.pptx
+++ b/research/Tickets_and_Data_Structure.pptx
@@ -1688,6 +1688,13 @@
         </dgm:presLayoutVars>
       </dgm:prSet>
       <dgm:spPr/>
+      <dgm:t>
+        <a:bodyPr/>
+        <a:lstStyle/>
+        <a:p>
+          <a:endParaRPr lang="en-US"/>
+        </a:p>
+      </dgm:t>
     </dgm:pt>
     <dgm:pt modelId="{0B900929-1421-49D4-AAD1-7B9CB4E420F3}" type="pres">
       <dgm:prSet presAssocID="{EDCF2C7E-FAC4-4614-9E71-C0B8A3B9B980}" presName="diamond" presStyleLbl="bgShp" presStyleIdx="0" presStyleCnt="1"/>
@@ -1763,8 +1770,8 @@
     </dgm:pt>
   </dgm:ptLst>
   <dgm:cxnLst>
+    <dgm:cxn modelId="{D32ED049-F3E5-4E58-9599-F479B8214E04}" type="presOf" srcId="{1312EB17-4F57-46DB-A07B-95FDD48090BB}" destId="{72350D64-DB06-486A-A20A-165CD38B6A9B}" srcOrd="0" destOrd="1" presId="urn:microsoft.com/office/officeart/2005/8/layout/matrix3"/>
     <dgm:cxn modelId="{DFAC5453-741F-43AF-84A9-2552B780E813}" srcId="{EDCF2C7E-FAC4-4614-9E71-C0B8A3B9B980}" destId="{FC62BFEF-98C7-4F60-90D2-BE05DCDDC21E}" srcOrd="0" destOrd="0" parTransId="{887109A7-51E2-4F94-ABFC-295F6348DA14}" sibTransId="{85ADD725-B99E-4802-959A-19644CA47634}"/>
-    <dgm:cxn modelId="{D32ED049-F3E5-4E58-9599-F479B8214E04}" type="presOf" srcId="{1312EB17-4F57-46DB-A07B-95FDD48090BB}" destId="{72350D64-DB06-486A-A20A-165CD38B6A9B}" srcOrd="0" destOrd="1" presId="urn:microsoft.com/office/officeart/2005/8/layout/matrix3"/>
     <dgm:cxn modelId="{DC951BFE-82B5-4A86-856C-B7165F48B176}" type="presOf" srcId="{03C42D11-98FA-42C3-93D6-7717E987B8EA}" destId="{0DED722D-CB4F-4303-B34C-9BAF7BABA173}" srcOrd="0" destOrd="5" presId="urn:microsoft.com/office/officeart/2005/8/layout/matrix3"/>
     <dgm:cxn modelId="{363931CF-C9B6-4BF4-99F8-258100303A50}" srcId="{FC62BFEF-98C7-4F60-90D2-BE05DCDDC21E}" destId="{317E49FB-D22A-430D-AF83-915FFA6D3D0D}" srcOrd="3" destOrd="0" parTransId="{FFC708C4-039E-4DD8-8460-576ECDB0C729}" sibTransId="{EDA4516D-761A-41C6-97D9-E3FF3C06E279}"/>
     <dgm:cxn modelId="{3DE394BA-6F6E-4638-AC2F-337447CB958D}" srcId="{FC62BFEF-98C7-4F60-90D2-BE05DCDDC21E}" destId="{8B039C3A-0C26-4123-8A95-287F0C8E170D}" srcOrd="5" destOrd="0" parTransId="{BC7E1A04-4BA4-4C06-BD25-839D41FB47EB}" sibTransId="{20BA7D08-D785-42AF-B63A-458E10BF84F7}"/>
@@ -1780,14 +1787,14 @@
     <dgm:cxn modelId="{B1AB63F8-170F-4867-A589-B61B66718ED7}" type="presOf" srcId="{34902F1C-ED4A-46A3-BF95-0AC915F22BA0}" destId="{72350D64-DB06-486A-A20A-165CD38B6A9B}" srcOrd="0" destOrd="2" presId="urn:microsoft.com/office/officeart/2005/8/layout/matrix3"/>
     <dgm:cxn modelId="{61ACDCDB-8262-49A4-A758-6472ACDE4830}" type="presOf" srcId="{0D510E7A-8FA9-4356-BB20-13F61FB7E755}" destId="{D7CB723A-40C5-4B21-9F14-65A2159AB73A}" srcOrd="0" destOrd="7" presId="urn:microsoft.com/office/officeart/2005/8/layout/matrix3"/>
     <dgm:cxn modelId="{B5165E31-1ABA-4808-9EC0-04A819CE9A08}" type="presOf" srcId="{15A8CECF-7AEF-4893-8EED-CAD20360515D}" destId="{D7CB723A-40C5-4B21-9F14-65A2159AB73A}" srcOrd="0" destOrd="8" presId="urn:microsoft.com/office/officeart/2005/8/layout/matrix3"/>
+    <dgm:cxn modelId="{05637CED-3AF1-4A89-8927-F14099B35060}" type="presOf" srcId="{9EED5AB6-3668-4447-B25D-E446DAD10376}" destId="{D7CB723A-40C5-4B21-9F14-65A2159AB73A}" srcOrd="0" destOrd="5" presId="urn:microsoft.com/office/officeart/2005/8/layout/matrix3"/>
     <dgm:cxn modelId="{DDE77CBA-5201-4C9F-B37C-414B731C17D0}" type="presOf" srcId="{8B039C3A-0C26-4123-8A95-287F0C8E170D}" destId="{D7CB723A-40C5-4B21-9F14-65A2159AB73A}" srcOrd="0" destOrd="6" presId="urn:microsoft.com/office/officeart/2005/8/layout/matrix3"/>
-    <dgm:cxn modelId="{05637CED-3AF1-4A89-8927-F14099B35060}" type="presOf" srcId="{9EED5AB6-3668-4447-B25D-E446DAD10376}" destId="{D7CB723A-40C5-4B21-9F14-65A2159AB73A}" srcOrd="0" destOrd="5" presId="urn:microsoft.com/office/officeart/2005/8/layout/matrix3"/>
     <dgm:cxn modelId="{BB8510FE-E786-497D-A1E7-920C7B864710}" type="presOf" srcId="{B12ADC69-32D2-4E61-9450-6A7E331FAE6F}" destId="{0DED722D-CB4F-4303-B34C-9BAF7BABA173}" srcOrd="0" destOrd="1" presId="urn:microsoft.com/office/officeart/2005/8/layout/matrix3"/>
     <dgm:cxn modelId="{1E00A6B0-1D01-4227-A121-C62A9B8E92FD}" type="presOf" srcId="{45165A1C-003D-4DBC-88A1-537C8592D5E4}" destId="{72350D64-DB06-486A-A20A-165CD38B6A9B}" srcOrd="0" destOrd="3" presId="urn:microsoft.com/office/officeart/2005/8/layout/matrix3"/>
     <dgm:cxn modelId="{E8E40639-C150-4547-A99C-02719E353D58}" srcId="{AB3F020B-5A7D-4262-84F6-B688212BBCCD}" destId="{3A7EF700-50B9-4EDA-9982-A268ACA4A551}" srcOrd="3" destOrd="0" parTransId="{862699F5-072D-4912-8FC3-0F7A3D84302B}" sibTransId="{C7FD2646-E03B-4B5D-AC0E-80B28C3E21F8}"/>
     <dgm:cxn modelId="{C7CA02E9-BDA5-4D32-9E6F-01439E0AC96E}" srcId="{6A0D0DA2-2576-4B37-8D02-142DC63E0C1E}" destId="{34902F1C-ED4A-46A3-BF95-0AC915F22BA0}" srcOrd="1" destOrd="0" parTransId="{1F2D1C7D-DF20-46CA-A37F-DACB60FE1BA5}" sibTransId="{676C3178-2489-4008-9A6E-A586FA3D0D29}"/>
+    <dgm:cxn modelId="{E6DDB9E7-C159-4636-B1EB-718AE50CEC8A}" srcId="{FC62BFEF-98C7-4F60-90D2-BE05DCDDC21E}" destId="{15A8CECF-7AEF-4893-8EED-CAD20360515D}" srcOrd="7" destOrd="0" parTransId="{CFB19142-4ECF-4A07-8642-CC4A4532D72E}" sibTransId="{0A08E09D-A5BD-4675-8980-8317CA3DA550}"/>
     <dgm:cxn modelId="{E7CDD163-2177-40F8-AF78-2A691BEE2CF9}" type="presOf" srcId="{FC62BFEF-98C7-4F60-90D2-BE05DCDDC21E}" destId="{D7CB723A-40C5-4B21-9F14-65A2159AB73A}" srcOrd="0" destOrd="0" presId="urn:microsoft.com/office/officeart/2005/8/layout/matrix3"/>
-    <dgm:cxn modelId="{E6DDB9E7-C159-4636-B1EB-718AE50CEC8A}" srcId="{FC62BFEF-98C7-4F60-90D2-BE05DCDDC21E}" destId="{15A8CECF-7AEF-4893-8EED-CAD20360515D}" srcOrd="7" destOrd="0" parTransId="{CFB19142-4ECF-4A07-8642-CC4A4532D72E}" sibTransId="{0A08E09D-A5BD-4675-8980-8317CA3DA550}"/>
     <dgm:cxn modelId="{F154E30B-DBD6-4941-9A70-ABDE53BC0070}" type="presOf" srcId="{6A0D0DA2-2576-4B37-8D02-142DC63E0C1E}" destId="{72350D64-DB06-486A-A20A-165CD38B6A9B}" srcOrd="0" destOrd="0" presId="urn:microsoft.com/office/officeart/2005/8/layout/matrix3"/>
     <dgm:cxn modelId="{D2F977D9-0714-4E1B-A5D7-D942A1983007}" type="presOf" srcId="{AB3F020B-5A7D-4262-84F6-B688212BBCCD}" destId="{0DED722D-CB4F-4303-B34C-9BAF7BABA173}" srcOrd="0" destOrd="0" presId="urn:microsoft.com/office/officeart/2005/8/layout/matrix3"/>
     <dgm:cxn modelId="{F8E5AAEF-2DB9-4E89-B0A1-177BFC9EE756}" srcId="{FC62BFEF-98C7-4F60-90D2-BE05DCDDC21E}" destId="{BF9488B2-F8BF-4EA5-B909-EF915FC33823}" srcOrd="2" destOrd="0" parTransId="{3723B38C-959A-4BD3-A0DC-55F140A9D4CD}" sibTransId="{9F4E8BB7-8A36-4470-9D16-635D7E9BA9D7}"/>
@@ -3953,7 +3960,8 @@
           <a:p>
             <a:fld id="{791D2D24-2167-4314-9FAD-47122C85E3B5}" type="datetimeFigureOut">
               <a:rPr lang="en-US" smtClean="0"/>
-              <a:t>5/2/2018</a:t>
+              <a:pPr/>
+              <a:t>5/4/2018</a:t>
             </a:fld>
             <a:endParaRPr lang="en-US"/>
           </a:p>
@@ -3995,6 +4003,7 @@
           <a:p>
             <a:fld id="{D22E85CD-C08E-4E45-A4DC-64EB98B98916}" type="slidenum">
               <a:rPr lang="en-US" smtClean="0"/>
+              <a:pPr/>
               <a:t>‹#›</a:t>
             </a:fld>
             <a:endParaRPr lang="en-US"/>
@@ -4118,7 +4127,8 @@
           <a:p>
             <a:fld id="{791D2D24-2167-4314-9FAD-47122C85E3B5}" type="datetimeFigureOut">
               <a:rPr lang="en-US" smtClean="0"/>
-              <a:t>5/2/2018</a:t>
+              <a:pPr/>
+              <a:t>5/4/2018</a:t>
             </a:fld>
             <a:endParaRPr lang="en-US"/>
           </a:p>
@@ -4160,6 +4170,7 @@
           <a:p>
             <a:fld id="{D22E85CD-C08E-4E45-A4DC-64EB98B98916}" type="slidenum">
               <a:rPr lang="en-US" smtClean="0"/>
+              <a:pPr/>
               <a:t>‹#›</a:t>
             </a:fld>
             <a:endParaRPr lang="en-US"/>
@@ -4293,7 +4304,8 @@
           <a:p>
             <a:fld id="{791D2D24-2167-4314-9FAD-47122C85E3B5}" type="datetimeFigureOut">
               <a:rPr lang="en-US" smtClean="0"/>
-              <a:t>5/2/2018</a:t>
+              <a:pPr/>
+              <a:t>5/4/2018</a:t>
             </a:fld>
             <a:endParaRPr lang="en-US"/>
           </a:p>
@@ -4335,6 +4347,7 @@
           <a:p>
             <a:fld id="{D22E85CD-C08E-4E45-A4DC-64EB98B98916}" type="slidenum">
               <a:rPr lang="en-US" smtClean="0"/>
+              <a:pPr/>
               <a:t>‹#›</a:t>
             </a:fld>
             <a:endParaRPr lang="en-US"/>
@@ -4458,7 +4471,8 @@
           <a:p>
             <a:fld id="{791D2D24-2167-4314-9FAD-47122C85E3B5}" type="datetimeFigureOut">
               <a:rPr lang="en-US" smtClean="0"/>
-              <a:t>5/2/2018</a:t>
+              <a:pPr/>
+              <a:t>5/4/2018</a:t>
             </a:fld>
             <a:endParaRPr lang="en-US"/>
           </a:p>
@@ -4500,6 +4514,7 @@
           <a:p>
             <a:fld id="{D22E85CD-C08E-4E45-A4DC-64EB98B98916}" type="slidenum">
               <a:rPr lang="en-US" smtClean="0"/>
+              <a:pPr/>
               <a:t>‹#›</a:t>
             </a:fld>
             <a:endParaRPr lang="en-US"/>
@@ -4699,7 +4714,8 @@
           <a:p>
             <a:fld id="{791D2D24-2167-4314-9FAD-47122C85E3B5}" type="datetimeFigureOut">
               <a:rPr lang="en-US" smtClean="0"/>
-              <a:t>5/2/2018</a:t>
+              <a:pPr/>
+              <a:t>5/4/2018</a:t>
             </a:fld>
             <a:endParaRPr lang="en-US"/>
           </a:p>
@@ -4741,6 +4757,7 @@
           <a:p>
             <a:fld id="{D22E85CD-C08E-4E45-A4DC-64EB98B98916}" type="slidenum">
               <a:rPr lang="en-US" smtClean="0"/>
+              <a:pPr/>
               <a:t>‹#›</a:t>
             </a:fld>
             <a:endParaRPr lang="en-US"/>
@@ -4982,7 +4999,8 @@
           <a:p>
             <a:fld id="{791D2D24-2167-4314-9FAD-47122C85E3B5}" type="datetimeFigureOut">
               <a:rPr lang="en-US" smtClean="0"/>
-              <a:t>5/2/2018</a:t>
+              <a:pPr/>
+              <a:t>5/4/2018</a:t>
             </a:fld>
             <a:endParaRPr lang="en-US"/>
           </a:p>
@@ -5024,6 +5042,7 @@
           <a:p>
             <a:fld id="{D22E85CD-C08E-4E45-A4DC-64EB98B98916}" type="slidenum">
               <a:rPr lang="en-US" smtClean="0"/>
+              <a:pPr/>
               <a:t>‹#›</a:t>
             </a:fld>
             <a:endParaRPr lang="en-US"/>
@@ -5399,7 +5418,8 @@
           <a:p>
             <a:fld id="{791D2D24-2167-4314-9FAD-47122C85E3B5}" type="datetimeFigureOut">
               <a:rPr lang="en-US" smtClean="0"/>
-              <a:t>5/2/2018</a:t>
+              <a:pPr/>
+              <a:t>5/4/2018</a:t>
             </a:fld>
             <a:endParaRPr lang="en-US"/>
           </a:p>
@@ -5441,6 +5461,7 @@
           <a:p>
             <a:fld id="{D22E85CD-C08E-4E45-A4DC-64EB98B98916}" type="slidenum">
               <a:rPr lang="en-US" smtClean="0"/>
+              <a:pPr/>
               <a:t>‹#›</a:t>
             </a:fld>
             <a:endParaRPr lang="en-US"/>
@@ -5512,7 +5533,8 @@
           <a:p>
             <a:fld id="{791D2D24-2167-4314-9FAD-47122C85E3B5}" type="datetimeFigureOut">
               <a:rPr lang="en-US" smtClean="0"/>
-              <a:t>5/2/2018</a:t>
+              <a:pPr/>
+              <a:t>5/4/2018</a:t>
             </a:fld>
             <a:endParaRPr lang="en-US"/>
           </a:p>
@@ -5554,6 +5576,7 @@
           <a:p>
             <a:fld id="{D22E85CD-C08E-4E45-A4DC-64EB98B98916}" type="slidenum">
               <a:rPr lang="en-US" smtClean="0"/>
+              <a:pPr/>
               <a:t>‹#›</a:t>
             </a:fld>
             <a:endParaRPr lang="en-US"/>
@@ -5602,7 +5625,8 @@
           <a:p>
             <a:fld id="{791D2D24-2167-4314-9FAD-47122C85E3B5}" type="datetimeFigureOut">
               <a:rPr lang="en-US" smtClean="0"/>
-              <a:t>5/2/2018</a:t>
+              <a:pPr/>
+              <a:t>5/4/2018</a:t>
             </a:fld>
             <a:endParaRPr lang="en-US"/>
           </a:p>
@@ -5644,6 +5668,7 @@
           <a:p>
             <a:fld id="{D22E85CD-C08E-4E45-A4DC-64EB98B98916}" type="slidenum">
               <a:rPr lang="en-US" smtClean="0"/>
+              <a:pPr/>
               <a:t>‹#›</a:t>
             </a:fld>
             <a:endParaRPr lang="en-US"/>
@@ -5874,7 +5899,8 @@
           <a:p>
             <a:fld id="{791D2D24-2167-4314-9FAD-47122C85E3B5}" type="datetimeFigureOut">
               <a:rPr lang="en-US" smtClean="0"/>
-              <a:t>5/2/2018</a:t>
+              <a:pPr/>
+              <a:t>5/4/2018</a:t>
             </a:fld>
             <a:endParaRPr lang="en-US"/>
           </a:p>
@@ -5916,6 +5942,7 @@
           <a:p>
             <a:fld id="{D22E85CD-C08E-4E45-A4DC-64EB98B98916}" type="slidenum">
               <a:rPr lang="en-US" smtClean="0"/>
+              <a:pPr/>
               <a:t>‹#›</a:t>
             </a:fld>
             <a:endParaRPr lang="en-US"/>
@@ -6122,7 +6149,8 @@
           <a:p>
             <a:fld id="{791D2D24-2167-4314-9FAD-47122C85E3B5}" type="datetimeFigureOut">
               <a:rPr lang="en-US" smtClean="0"/>
-              <a:t>5/2/2018</a:t>
+              <a:pPr/>
+              <a:t>5/4/2018</a:t>
             </a:fld>
             <a:endParaRPr lang="en-US"/>
           </a:p>
@@ -6164,6 +6192,7 @@
           <a:p>
             <a:fld id="{D22E85CD-C08E-4E45-A4DC-64EB98B98916}" type="slidenum">
               <a:rPr lang="en-US" smtClean="0"/>
+              <a:pPr/>
               <a:t>‹#›</a:t>
             </a:fld>
             <a:endParaRPr lang="en-US"/>
@@ -6330,7 +6359,8 @@
           <a:p>
             <a:fld id="{791D2D24-2167-4314-9FAD-47122C85E3B5}" type="datetimeFigureOut">
               <a:rPr lang="en-US" smtClean="0"/>
-              <a:t>5/2/2018</a:t>
+              <a:pPr/>
+              <a:t>5/4/2018</a:t>
             </a:fld>
             <a:endParaRPr lang="en-US"/>
           </a:p>
@@ -6408,6 +6438,7 @@
           <a:p>
             <a:fld id="{D22E85CD-C08E-4E45-A4DC-64EB98B98916}" type="slidenum">
               <a:rPr lang="en-US" smtClean="0"/>
+              <a:pPr/>
               <a:t>‹#›</a:t>
             </a:fld>
             <a:endParaRPr lang="en-US"/>
@@ -6753,8 +6784,8 @@
         </p:nvCxnSpPr>
         <p:spPr>
           <a:xfrm>
-            <a:off x="2209800" y="3048000"/>
-            <a:ext cx="1371600" cy="2819400"/>
+            <a:off x="2133600" y="1295400"/>
+            <a:ext cx="1524000" cy="4572000"/>
           </a:xfrm>
           <a:prstGeom prst="straightConnector1">
             <a:avLst/>
@@ -6787,8 +6818,8 @@
           <p:nvPr/>
         </p:nvGraphicFramePr>
         <p:xfrm>
-          <a:off x="533400" y="2438400"/>
-          <a:ext cx="1600200" cy="2494280"/>
+          <a:off x="533400" y="762000"/>
+          <a:ext cx="1600200" cy="5328920"/>
         </p:xfrm>
         <a:graphic>
           <a:graphicData uri="http://schemas.openxmlformats.org/drawingml/2006/table">
@@ -6827,11 +6858,7 @@
                       </a:r>
                       <a:r>
                         <a:rPr lang="en-US" baseline="0" dirty="0" smtClean="0"/>
-                        <a:t>id </a:t>
-                      </a:r>
-                      <a:r>
-                        <a:rPr lang="en-US" baseline="0" dirty="0" smtClean="0"/>
-                        <a:t>(PK)</a:t>
+                        <a:t>id (PK)</a:t>
                       </a:r>
                       <a:endParaRPr lang="en-US" dirty="0" smtClean="0"/>
                     </a:p>
@@ -6863,7 +6890,7 @@
                     <a:p>
                       <a:r>
                         <a:rPr lang="en-US" dirty="0" smtClean="0"/>
-                        <a:t>Address</a:t>
+                        <a:t>Shipping Address</a:t>
                       </a:r>
                       <a:endParaRPr lang="en-US" dirty="0"/>
                     </a:p>
@@ -6909,7 +6936,66 @@
                         <a:rPr lang="en-US" baseline="0" dirty="0" smtClean="0"/>
                         <a:t>)</a:t>
                       </a:r>
-                      <a:endParaRPr lang="en-US" dirty="0"/>
+                    </a:p>
+                  </a:txBody>
+                  <a:tcPr/>
+                </a:tc>
+              </a:tr>
+              <a:tr h="370840">
+                <a:tc>
+                  <a:txBody>
+                    <a:bodyPr/>
+                    <a:lstStyle/>
+                    <a:p>
+                      <a:r>
+                        <a:rPr lang="en-US" baseline="0" dirty="0" smtClean="0"/>
+                        <a:t>Billing Address</a:t>
+                      </a:r>
+                    </a:p>
+                  </a:txBody>
+                  <a:tcPr/>
+                </a:tc>
+              </a:tr>
+              <a:tr h="370840">
+                <a:tc>
+                  <a:txBody>
+                    <a:bodyPr/>
+                    <a:lstStyle/>
+                    <a:p>
+                      <a:r>
+                        <a:rPr lang="en-US" baseline="0" dirty="0" smtClean="0"/>
+                        <a:t>Second Shipping Address</a:t>
+                      </a:r>
+                    </a:p>
+                  </a:txBody>
+                  <a:tcPr/>
+                </a:tc>
+              </a:tr>
+              <a:tr h="370840">
+                <a:tc>
+                  <a:txBody>
+                    <a:bodyPr/>
+                    <a:lstStyle/>
+                    <a:p>
+                      <a:r>
+                        <a:rPr lang="en-US" baseline="0" dirty="0" smtClean="0"/>
+                        <a:t>Second Billing Address</a:t>
+                      </a:r>
+                    </a:p>
+                  </a:txBody>
+                  <a:tcPr/>
+                </a:tc>
+              </a:tr>
+              <a:tr h="370840">
+                <a:tc>
+                  <a:txBody>
+                    <a:bodyPr/>
+                    <a:lstStyle/>
+                    <a:p>
+                      <a:r>
+                        <a:rPr lang="en-US" baseline="0" dirty="0" smtClean="0"/>
+                        <a:t>Payment Methods</a:t>
+                      </a:r>
                     </a:p>
                   </a:txBody>
                   <a:tcPr/>
@@ -7095,11 +7181,7 @@
                       </a:r>
                       <a:r>
                         <a:rPr lang="en-US" baseline="0" dirty="0" smtClean="0"/>
-                        <a:t>id </a:t>
-                      </a:r>
-                      <a:r>
-                        <a:rPr lang="en-US" baseline="0" dirty="0" smtClean="0"/>
-                        <a:t>(PK)</a:t>
+                        <a:t>id (PK)</a:t>
                       </a:r>
                       <a:endParaRPr lang="en-US" dirty="0" smtClean="0"/>
                     </a:p>
@@ -7195,8 +7277,8 @@
         </p:nvCxnSpPr>
         <p:spPr>
           <a:xfrm>
-            <a:off x="2209800" y="3048000"/>
-            <a:ext cx="1295400" cy="228600"/>
+            <a:off x="2133600" y="1295400"/>
+            <a:ext cx="1447800" cy="1981200"/>
           </a:xfrm>
           <a:prstGeom prst="straightConnector1">
             <a:avLst/>
@@ -7269,15 +7351,7 @@
                       </a:r>
                       <a:r>
                         <a:rPr lang="en-US" baseline="0" dirty="0" smtClean="0"/>
-                        <a:t> </a:t>
-                      </a:r>
-                      <a:r>
-                        <a:rPr lang="en-US" baseline="0" dirty="0" smtClean="0"/>
-                        <a:t>Id (PK</a:t>
-                      </a:r>
-                      <a:r>
-                        <a:rPr lang="en-US" baseline="0" dirty="0" smtClean="0"/>
-                        <a:t>)</a:t>
+                        <a:t> Id (PK)</a:t>
                       </a:r>
                     </a:p>
                   </a:txBody>
@@ -7296,11 +7370,7 @@
                       </a:r>
                       <a:r>
                         <a:rPr lang="en-US" baseline="0" dirty="0" smtClean="0"/>
-                        <a:t> ID </a:t>
-                      </a:r>
-                      <a:r>
-                        <a:rPr lang="en-US" baseline="0" dirty="0" smtClean="0"/>
-                        <a:t>(FK)</a:t>
+                        <a:t> ID (FK)</a:t>
                       </a:r>
                       <a:endParaRPr lang="en-US" dirty="0" smtClean="0"/>
                     </a:p>
@@ -7360,8 +7430,8 @@
         </p:nvCxnSpPr>
         <p:spPr>
           <a:xfrm>
-            <a:off x="5257800" y="1524000"/>
-            <a:ext cx="1524000" cy="1828800"/>
+            <a:off x="5181600" y="1447800"/>
+            <a:ext cx="1676400" cy="1905000"/>
           </a:xfrm>
           <a:prstGeom prst="straightConnector1">
             <a:avLst/>
@@ -7393,8 +7463,8 @@
         </p:nvCxnSpPr>
         <p:spPr>
           <a:xfrm flipV="1">
-            <a:off x="5334000" y="4114800"/>
-            <a:ext cx="1447800" cy="609600"/>
+            <a:off x="5257800" y="4114800"/>
+            <a:ext cx="1600200" cy="609600"/>
           </a:xfrm>
           <a:prstGeom prst="straightConnector1">
             <a:avLst/>

</xml_diff>